<commit_message>
Update to week 2 slides
</commit_message>
<xml_diff>
--- a/02 Strategy/Patterns - Introduction.pptx
+++ b/02 Strategy/Patterns - Introduction.pptx
@@ -212,7 +212,7 @@
           <a:p>
             <a:fld id="{8A6E8EB0-8888-4A4E-94F3-14D8E5038AB6}" type="datetimeFigureOut">
               <a:rPr lang="en-US" smtClean="0"/>
-              <a:t>9/19/2016</a:t>
+              <a:t>9/4/23</a:t>
             </a:fld>
             <a:endParaRPr lang="en-US"/>
           </a:p>
@@ -276,38 +276,37 @@
           <a:p>
             <a:pPr lvl="0"/>
             <a:r>
-              <a:rPr lang="en-US" smtClean="0"/>
+              <a:rPr lang="en-US"/>
               <a:t>Click to edit Master text styles</a:t>
             </a:r>
           </a:p>
           <a:p>
             <a:pPr lvl="1"/>
             <a:r>
-              <a:rPr lang="en-US" smtClean="0"/>
+              <a:rPr lang="en-US"/>
               <a:t>Second level</a:t>
             </a:r>
           </a:p>
           <a:p>
             <a:pPr lvl="2"/>
             <a:r>
-              <a:rPr lang="en-US" smtClean="0"/>
+              <a:rPr lang="en-US"/>
               <a:t>Third level</a:t>
             </a:r>
           </a:p>
           <a:p>
             <a:pPr lvl="3"/>
             <a:r>
-              <a:rPr lang="en-US" smtClean="0"/>
+              <a:rPr lang="en-US"/>
               <a:t>Fourth level</a:t>
             </a:r>
           </a:p>
           <a:p>
             <a:pPr lvl="4"/>
             <a:r>
-              <a:rPr lang="en-US" smtClean="0"/>
+              <a:rPr lang="en-US"/>
               <a:t>Fifth level</a:t>
             </a:r>
-            <a:endParaRPr lang="en-US"/>
           </a:p>
         </p:txBody>
       </p:sp>
@@ -954,10 +953,9 @@
           </a:lstStyle>
           <a:p>
             <a:r>
-              <a:rPr lang="en-US" dirty="0" smtClean="0"/>
+              <a:rPr lang="en-US" dirty="0"/>
               <a:t>Click to edit Master title style</a:t>
             </a:r>
-            <a:endParaRPr lang="en-US" dirty="0"/>
           </a:p>
         </p:txBody>
       </p:sp>
@@ -1076,10 +1074,9 @@
           </a:lstStyle>
           <a:p>
             <a:r>
-              <a:rPr lang="en-US" smtClean="0"/>
+              <a:rPr lang="en-US"/>
               <a:t>Click to edit Master subtitle style</a:t>
             </a:r>
-            <a:endParaRPr lang="en-US"/>
           </a:p>
         </p:txBody>
       </p:sp>
@@ -1093,13 +1090,6 @@
   <p:clrMapOvr>
     <a:masterClrMapping/>
   </p:clrMapOvr>
-  <p:timing>
-    <p:tnLst>
-      <p:par>
-        <p:cTn id="1" dur="indefinite" restart="never" nodeType="tmRoot"/>
-      </p:par>
-    </p:tnLst>
-  </p:timing>
   <p:hf sldNum="0" hdr="0" ftr="0"/>
 </p:sldLayout>
 </file>
@@ -1158,10 +1148,9 @@
           </a:lstStyle>
           <a:p>
             <a:r>
-              <a:rPr lang="en-US" dirty="0" smtClean="0"/>
+              <a:rPr lang="en-US" dirty="0"/>
               <a:t>Click to edit Master title style</a:t>
             </a:r>
-            <a:endParaRPr lang="en-US" dirty="0"/>
           </a:p>
         </p:txBody>
       </p:sp>
@@ -1231,38 +1220,37 @@
           <a:p>
             <a:pPr lvl="0"/>
             <a:r>
-              <a:rPr lang="en-US" dirty="0" smtClean="0"/>
+              <a:rPr lang="en-US" dirty="0"/>
               <a:t>Click to edit Master text styles</a:t>
             </a:r>
           </a:p>
           <a:p>
             <a:pPr lvl="1"/>
             <a:r>
-              <a:rPr lang="en-US" dirty="0" smtClean="0"/>
+              <a:rPr lang="en-US" dirty="0"/>
               <a:t>Second level</a:t>
             </a:r>
           </a:p>
           <a:p>
             <a:pPr lvl="2"/>
             <a:r>
-              <a:rPr lang="en-US" dirty="0" smtClean="0"/>
+              <a:rPr lang="en-US" dirty="0"/>
               <a:t>Third level</a:t>
             </a:r>
           </a:p>
           <a:p>
             <a:pPr lvl="3"/>
             <a:r>
-              <a:rPr lang="en-US" dirty="0" smtClean="0"/>
+              <a:rPr lang="en-US" dirty="0"/>
               <a:t>Fourth level</a:t>
             </a:r>
           </a:p>
           <a:p>
             <a:pPr lvl="4"/>
             <a:r>
-              <a:rPr lang="en-US" dirty="0" smtClean="0"/>
+              <a:rPr lang="en-US" dirty="0"/>
               <a:t>Fifth level</a:t>
             </a:r>
-            <a:endParaRPr lang="en-US" dirty="0"/>
           </a:p>
         </p:txBody>
       </p:sp>
@@ -1360,13 +1348,6 @@
   <p:clrMapOvr>
     <a:masterClrMapping/>
   </p:clrMapOvr>
-  <p:timing>
-    <p:tnLst>
-      <p:par>
-        <p:cTn id="1" dur="indefinite" restart="never" nodeType="tmRoot"/>
-      </p:par>
-    </p:tnLst>
-  </p:timing>
 </p:sldLayout>
 </file>
 
@@ -1418,10 +1399,9 @@
           <a:lstStyle/>
           <a:p>
             <a:r>
-              <a:rPr lang="en-US" dirty="0" smtClean="0"/>
+              <a:rPr lang="en-US" dirty="0"/>
               <a:t>Click to edit Master title style</a:t>
             </a:r>
-            <a:endParaRPr lang="en-US" dirty="0"/>
           </a:p>
         </p:txBody>
       </p:sp>
@@ -1452,38 +1432,37 @@
           <a:p>
             <a:pPr lvl="0"/>
             <a:r>
-              <a:rPr lang="en-US" dirty="0" smtClean="0"/>
+              <a:rPr lang="en-US" dirty="0"/>
               <a:t>Click to edit Master text styles</a:t>
             </a:r>
           </a:p>
           <a:p>
             <a:pPr lvl="1"/>
             <a:r>
-              <a:rPr lang="en-US" dirty="0" smtClean="0"/>
+              <a:rPr lang="en-US" dirty="0"/>
               <a:t>Second level</a:t>
             </a:r>
           </a:p>
           <a:p>
             <a:pPr lvl="2"/>
             <a:r>
-              <a:rPr lang="en-US" dirty="0" smtClean="0"/>
+              <a:rPr lang="en-US" dirty="0"/>
               <a:t>Third level</a:t>
             </a:r>
           </a:p>
           <a:p>
             <a:pPr lvl="3"/>
             <a:r>
-              <a:rPr lang="en-US" dirty="0" smtClean="0"/>
+              <a:rPr lang="en-US" dirty="0"/>
               <a:t>Fourth level</a:t>
             </a:r>
           </a:p>
           <a:p>
             <a:pPr lvl="4"/>
             <a:r>
-              <a:rPr lang="en-US" dirty="0" smtClean="0"/>
+              <a:rPr lang="en-US" dirty="0"/>
               <a:t>Fifth level</a:t>
             </a:r>
-            <a:endParaRPr lang="en-US" dirty="0"/>
           </a:p>
         </p:txBody>
       </p:sp>
@@ -1538,13 +1517,6 @@
     <p:sldLayoutId id="2147483649" r:id="rId1"/>
     <p:sldLayoutId id="2147483650" r:id="rId2"/>
   </p:sldLayoutIdLst>
-  <p:timing>
-    <p:tnLst>
-      <p:par>
-        <p:cTn id="1" dur="indefinite" restart="never" nodeType="tmRoot"/>
-      </p:par>
-    </p:tnLst>
-  </p:timing>
   <p:txStyles>
     <p:titleStyle>
       <a:lvl1pPr algn="ctr" defTabSz="914400" rtl="0" eaLnBrk="1" latinLnBrk="0" hangingPunct="1">
@@ -1841,21 +1813,17 @@
           <a:lstStyle/>
           <a:p>
             <a:r>
-              <a:rPr lang="da-DK" dirty="0" smtClean="0"/>
+              <a:rPr lang="da-DK" dirty="0"/>
               <a:t>Design Patterns</a:t>
-            </a:r>
-            <a:br>
-              <a:rPr lang="da-DK" dirty="0" smtClean="0"/>
-            </a:br>
-            <a:r>
-              <a:rPr lang="da-DK" dirty="0"/>
-              <a:t/>
             </a:r>
             <a:br>
               <a:rPr lang="da-DK" dirty="0"/>
             </a:br>
-            <a:r>
-              <a:rPr lang="da-DK" dirty="0" err="1" smtClean="0"/>
+            <a:br>
+              <a:rPr lang="da-DK" dirty="0"/>
+            </a:br>
+            <a:r>
+              <a:rPr lang="da-DK" dirty="0" err="1"/>
               <a:t>Introduction</a:t>
             </a:r>
             <a:endParaRPr lang="en-US" dirty="0"/>
@@ -1885,16 +1853,15 @@
           <a:lstStyle/>
           <a:p>
             <a:r>
-              <a:rPr lang="en-US" sz="2400" i="1" dirty="0" smtClean="0"/>
+              <a:rPr lang="en-US" sz="2400" i="1" dirty="0"/>
               <a:t>“The critical design tool for software development</a:t>
             </a:r>
           </a:p>
           <a:p>
             <a:r>
-              <a:rPr lang="en-US" sz="2400" i="1" dirty="0" smtClean="0"/>
+              <a:rPr lang="en-US" sz="2400" i="1" dirty="0"/>
               <a:t>is a mind well educated in design principles”</a:t>
             </a:r>
-            <a:endParaRPr lang="en-US" sz="2400" i="1" dirty="0"/>
           </a:p>
         </p:txBody>
       </p:sp>
@@ -1908,13 +1875,6 @@
   <p:clrMapOvr>
     <a:masterClrMapping/>
   </p:clrMapOvr>
-  <p:timing>
-    <p:tnLst>
-      <p:par>
-        <p:cTn id="1" dur="indefinite" restart="never" nodeType="tmRoot"/>
-      </p:par>
-    </p:tnLst>
-  </p:timing>
 </p:sld>
 </file>
 
@@ -1953,7 +1913,7 @@
           <a:lstStyle/>
           <a:p>
             <a:r>
-              <a:rPr lang="en-US" dirty="0" smtClean="0"/>
+              <a:rPr lang="en-US" dirty="0"/>
               <a:t>What is a design pattern?</a:t>
             </a:r>
             <a:endParaRPr lang="en-US" sz="1800" dirty="0"/>
@@ -1992,35 +1952,23 @@
           </a:bodyPr>
           <a:lstStyle/>
           <a:p>
-            <a:endParaRPr lang="en-US" i="1" dirty="0" smtClean="0"/>
-          </a:p>
-          <a:p>
-            <a:r>
-              <a:rPr lang="en-US" sz="2400" i="1" dirty="0" smtClean="0"/>
-              <a:t>“(…) </a:t>
-            </a:r>
+            <a:endParaRPr lang="en-US" i="1" dirty="0"/>
+          </a:p>
+          <a:p>
             <a:r>
               <a:rPr lang="en-US" sz="2400" i="1" dirty="0"/>
-              <a:t>Each pattern describes a problem that occurs over and over again in our environment, and then describes the core of the solution to that problem, in such a way that you can use this solution a million times over, without ever doing it the same way twice.” </a:t>
+              <a:t>“(…) Each pattern describes a problem that occurs over and over again in our environment, and then describes the core of the solution to that problem, in such a way that you can use this solution a million times over, without ever doing it the same way twice.” </a:t>
             </a:r>
           </a:p>
           <a:p>
             <a:pPr marL="0" lvl="1"/>
-            <a:endParaRPr lang="en-US" sz="1400" i="1" dirty="0" smtClean="0"/>
+            <a:endParaRPr lang="en-US" sz="1400" i="1" dirty="0"/>
           </a:p>
           <a:p>
             <a:pPr marL="0" lvl="1"/>
             <a:r>
-              <a:rPr lang="en-US" sz="1400" i="1" dirty="0" smtClean="0"/>
-              <a:t>					          Christopher </a:t>
-            </a:r>
-            <a:r>
               <a:rPr lang="en-US" sz="1400" i="1" dirty="0"/>
-              <a:t>Alexander, </a:t>
-            </a:r>
-            <a:r>
-              <a:rPr lang="en-US" sz="1400" i="1" dirty="0" smtClean="0"/>
-              <a:t>architect</a:t>
+              <a:t>					          Christopher Alexander, architect</a:t>
             </a:r>
             <a:endParaRPr lang="da-DK" dirty="0"/>
           </a:p>
@@ -2160,7 +2108,7 @@
           <a:lstStyle/>
           <a:p>
             <a:r>
-              <a:rPr lang="en-US" dirty="0" smtClean="0"/>
+              <a:rPr lang="en-US" dirty="0"/>
               <a:t>Design patterns give us a vocabulary</a:t>
             </a:r>
             <a:endParaRPr lang="en-US" sz="1800" dirty="0"/>
@@ -2212,26 +2160,25 @@
               </a:tabLst>
             </a:pPr>
             <a:r>
-              <a:rPr lang="en-US" sz="2000" dirty="0" smtClean="0"/>
+              <a:rPr lang="en-US" sz="2000" dirty="0"/>
               <a:t>Couldn’t we just use </a:t>
             </a:r>
             <a:r>
-              <a:rPr lang="en-US" sz="2000" i="1" dirty="0" smtClean="0"/>
+              <a:rPr lang="en-US" sz="2000" i="1" dirty="0"/>
               <a:t>Strategy</a:t>
             </a:r>
             <a:r>
-              <a:rPr lang="en-US" sz="2000" dirty="0" smtClean="0"/>
+              <a:rPr lang="en-US" sz="2000" dirty="0"/>
               <a:t> and </a:t>
             </a:r>
             <a:r>
-              <a:rPr lang="en-US" sz="2000" i="1" dirty="0" smtClean="0"/>
+              <a:rPr lang="en-US" sz="2000" i="1" dirty="0"/>
               <a:t>Iterator</a:t>
             </a:r>
             <a:r>
-              <a:rPr lang="en-US" sz="2000" dirty="0" smtClean="0"/>
+              <a:rPr lang="en-US" sz="2000" dirty="0"/>
               <a:t> to solve that?</a:t>
             </a:r>
-            <a:endParaRPr lang="en-US" sz="2000" dirty="0"/>
           </a:p>
         </p:txBody>
       </p:sp>
@@ -2276,26 +2223,25 @@
           <a:p>
             <a:pPr marL="180975" lvl="1"/>
             <a:r>
-              <a:rPr lang="en-US" sz="2000" dirty="0" smtClean="0"/>
+              <a:rPr lang="en-US" sz="2000" dirty="0"/>
               <a:t>Apply </a:t>
             </a:r>
             <a:r>
-              <a:rPr lang="en-US" sz="2000" i="1" dirty="0" smtClean="0"/>
+              <a:rPr lang="en-US" sz="2000" i="1" dirty="0"/>
               <a:t>State</a:t>
             </a:r>
             <a:r>
-              <a:rPr lang="en-US" sz="2000" dirty="0" smtClean="0"/>
+              <a:rPr lang="en-US" sz="2000" dirty="0"/>
               <a:t> and </a:t>
             </a:r>
             <a:r>
-              <a:rPr lang="en-US" sz="2000" i="1" dirty="0" smtClean="0"/>
+              <a:rPr lang="en-US" sz="2000" i="1" dirty="0"/>
               <a:t>Command </a:t>
             </a:r>
             <a:r>
-              <a:rPr lang="en-US" sz="2000" dirty="0" smtClean="0"/>
+              <a:rPr lang="en-US" sz="2000" dirty="0"/>
               <a:t>together, and we’re home free!</a:t>
             </a:r>
-            <a:endParaRPr lang="en-US" sz="2000" dirty="0"/>
           </a:p>
         </p:txBody>
       </p:sp>
@@ -2340,18 +2286,17 @@
           <a:p>
             <a:pPr marL="85725" lvl="1"/>
             <a:r>
-              <a:rPr lang="en-US" sz="2000" dirty="0" smtClean="0"/>
+              <a:rPr lang="en-US" sz="2000" dirty="0"/>
               <a:t>Should we build the server as a </a:t>
             </a:r>
             <a:r>
-              <a:rPr lang="en-US" sz="2000" i="1" dirty="0" smtClean="0"/>
+              <a:rPr lang="en-US" sz="2000" i="1" dirty="0"/>
               <a:t>Reactor</a:t>
             </a:r>
             <a:r>
-              <a:rPr lang="en-US" sz="2000" dirty="0" smtClean="0"/>
+              <a:rPr lang="en-US" sz="2000" dirty="0"/>
               <a:t>?</a:t>
             </a:r>
-            <a:endParaRPr lang="en-US" sz="2000" dirty="0"/>
           </a:p>
         </p:txBody>
       </p:sp>
@@ -2573,7 +2518,7 @@
           <a:lstStyle/>
           <a:p>
             <a:r>
-              <a:rPr lang="en-US" dirty="0" smtClean="0"/>
+              <a:rPr lang="en-US" dirty="0"/>
               <a:t>Gang-of-Four Design Patterns</a:t>
             </a:r>
             <a:endParaRPr lang="en-US" sz="1800" dirty="0"/>
@@ -2649,13 +2594,6 @@
   <p:clrMapOvr>
     <a:masterClrMapping/>
   </p:clrMapOvr>
-  <p:timing>
-    <p:tnLst>
-      <p:par>
-        <p:cTn id="1" dur="indefinite" restart="never" nodeType="tmRoot"/>
-      </p:par>
-    </p:tnLst>
-  </p:timing>
 </p:sld>
 </file>
 
@@ -2724,109 +2662,109 @@
           <a:lstStyle/>
           <a:p>
             <a:r>
-              <a:rPr lang="en-US" sz="2000" i="1" dirty="0" smtClean="0"/>
+              <a:rPr lang="en-US" sz="2000" i="1" dirty="0"/>
               <a:t>Creational</a:t>
             </a:r>
             <a:r>
-              <a:rPr lang="en-US" sz="2000" dirty="0" smtClean="0"/>
+              <a:rPr lang="en-US" sz="2000" dirty="0"/>
               <a:t> patterns</a:t>
             </a:r>
           </a:p>
           <a:p>
             <a:pPr lvl="1"/>
             <a:r>
-              <a:rPr lang="en-US" sz="1800" dirty="0" smtClean="0"/>
+              <a:rPr lang="en-US" sz="1800" dirty="0"/>
               <a:t>Abstract Factory</a:t>
             </a:r>
           </a:p>
           <a:p>
             <a:pPr lvl="1"/>
             <a:r>
-              <a:rPr lang="en-US" sz="1800" dirty="0" smtClean="0"/>
+              <a:rPr lang="en-US" sz="1800" dirty="0"/>
               <a:t>Builder</a:t>
             </a:r>
           </a:p>
           <a:p>
             <a:pPr lvl="1"/>
             <a:r>
-              <a:rPr lang="en-US" sz="1800" dirty="0" smtClean="0"/>
+              <a:rPr lang="en-US" sz="1800" dirty="0"/>
               <a:t>Factory Method</a:t>
             </a:r>
           </a:p>
           <a:p>
             <a:pPr lvl="1"/>
             <a:r>
-              <a:rPr lang="en-US" sz="1800" dirty="0" smtClean="0"/>
+              <a:rPr lang="en-US" sz="1800" dirty="0"/>
               <a:t>Prototype</a:t>
             </a:r>
           </a:p>
           <a:p>
             <a:pPr lvl="1"/>
             <a:r>
-              <a:rPr lang="en-US" sz="1800" dirty="0" smtClean="0"/>
+              <a:rPr lang="en-US" sz="1800" dirty="0"/>
               <a:t>Singleton</a:t>
             </a:r>
           </a:p>
           <a:p>
             <a:pPr lvl="1"/>
-            <a:endParaRPr lang="en-US" sz="2000" i="1" dirty="0" smtClean="0"/>
-          </a:p>
-          <a:p>
-            <a:r>
-              <a:rPr lang="en-US" sz="2000" i="1" dirty="0" smtClean="0"/>
+            <a:endParaRPr lang="en-US" sz="2000" i="1" dirty="0"/>
+          </a:p>
+          <a:p>
+            <a:r>
+              <a:rPr lang="en-US" sz="2000" i="1" dirty="0"/>
               <a:t>Structural</a:t>
             </a:r>
             <a:r>
-              <a:rPr lang="en-US" sz="2000" dirty="0" smtClean="0"/>
+              <a:rPr lang="en-US" sz="2000" dirty="0"/>
               <a:t> patterns</a:t>
             </a:r>
           </a:p>
           <a:p>
             <a:pPr lvl="1"/>
             <a:r>
-              <a:rPr lang="en-US" sz="1800" dirty="0" smtClean="0"/>
+              <a:rPr lang="en-US" sz="1800" dirty="0"/>
               <a:t>Adaptive</a:t>
             </a:r>
           </a:p>
           <a:p>
             <a:pPr lvl="1"/>
             <a:r>
-              <a:rPr lang="en-US" sz="1800" dirty="0" smtClean="0"/>
+              <a:rPr lang="en-US" sz="1800" dirty="0"/>
               <a:t>Bridge</a:t>
             </a:r>
           </a:p>
           <a:p>
             <a:pPr lvl="1"/>
             <a:r>
-              <a:rPr lang="en-US" sz="1800" dirty="0" smtClean="0"/>
+              <a:rPr lang="en-US" sz="1800" dirty="0"/>
               <a:t>Composite</a:t>
             </a:r>
           </a:p>
           <a:p>
             <a:pPr lvl="1"/>
             <a:r>
-              <a:rPr lang="en-US" sz="1800" dirty="0" smtClean="0"/>
+              <a:rPr lang="en-US" sz="1800" dirty="0"/>
               <a:t>Decorator</a:t>
             </a:r>
           </a:p>
           <a:p>
             <a:pPr lvl="1"/>
             <a:r>
-              <a:rPr lang="en-US" sz="1800" dirty="0" smtClean="0"/>
+              <a:rPr lang="en-US" sz="1800" dirty="0"/>
               <a:t>Façade</a:t>
             </a:r>
           </a:p>
           <a:p>
             <a:pPr lvl="1"/>
             <a:r>
-              <a:rPr lang="en-US" sz="1800" dirty="0" smtClean="0"/>
+              <a:rPr lang="en-US" sz="1800" dirty="0"/>
               <a:t>Flyweight</a:t>
             </a:r>
           </a:p>
           <a:p>
             <a:pPr lvl="1"/>
             <a:r>
-              <a:rPr lang="en-US" sz="1800" dirty="0" smtClean="0"/>
+              <a:rPr lang="en-US" sz="1800" dirty="0"/>
               <a:t>Proxy</a:t>
             </a:r>
           </a:p>
@@ -2995,88 +2933,88 @@
           </a:lstStyle>
           <a:p>
             <a:r>
-              <a:rPr lang="en-US" sz="2000" i="1" dirty="0" smtClean="0"/>
+              <a:rPr lang="en-US" sz="2000" i="1" dirty="0"/>
               <a:t>Behavioral</a:t>
             </a:r>
             <a:r>
-              <a:rPr lang="en-US" sz="2000" dirty="0" smtClean="0"/>
+              <a:rPr lang="en-US" sz="2000" dirty="0"/>
               <a:t> patterns</a:t>
             </a:r>
           </a:p>
           <a:p>
             <a:pPr lvl="1"/>
             <a:r>
-              <a:rPr lang="en-US" sz="1800" dirty="0" smtClean="0"/>
+              <a:rPr lang="en-US" sz="1800" dirty="0"/>
               <a:t>Chain of Responsibility</a:t>
             </a:r>
           </a:p>
           <a:p>
             <a:pPr lvl="1"/>
             <a:r>
-              <a:rPr lang="en-US" sz="1800" dirty="0" smtClean="0"/>
+              <a:rPr lang="en-US" sz="1800" dirty="0"/>
               <a:t>Command</a:t>
             </a:r>
           </a:p>
           <a:p>
             <a:pPr lvl="1"/>
             <a:r>
-              <a:rPr lang="en-US" sz="1800" dirty="0" smtClean="0"/>
+              <a:rPr lang="en-US" sz="1800" dirty="0"/>
               <a:t>Interpreter</a:t>
             </a:r>
           </a:p>
           <a:p>
             <a:pPr lvl="1"/>
             <a:r>
-              <a:rPr lang="en-US" sz="1800" dirty="0" smtClean="0"/>
+              <a:rPr lang="en-US" sz="1800" dirty="0"/>
               <a:t>Iterator</a:t>
             </a:r>
           </a:p>
           <a:p>
             <a:pPr lvl="1"/>
             <a:r>
-              <a:rPr lang="en-US" sz="1800" dirty="0" smtClean="0"/>
+              <a:rPr lang="en-US" sz="1800" dirty="0"/>
               <a:t>Mediator</a:t>
             </a:r>
           </a:p>
           <a:p>
             <a:pPr lvl="1"/>
             <a:r>
-              <a:rPr lang="en-US" sz="1800" dirty="0" smtClean="0"/>
+              <a:rPr lang="en-US" sz="1800" dirty="0"/>
               <a:t>Memento</a:t>
             </a:r>
           </a:p>
           <a:p>
             <a:pPr lvl="1"/>
             <a:r>
-              <a:rPr lang="en-US" sz="1800" dirty="0" smtClean="0"/>
+              <a:rPr lang="en-US" sz="1800" dirty="0"/>
               <a:t>Observer</a:t>
             </a:r>
           </a:p>
           <a:p>
             <a:pPr lvl="1"/>
             <a:r>
-              <a:rPr lang="en-US" sz="1800" dirty="0" smtClean="0"/>
+              <a:rPr lang="en-US" sz="1800" dirty="0"/>
               <a:t>State</a:t>
             </a:r>
           </a:p>
           <a:p>
             <a:pPr lvl="1"/>
             <a:r>
-              <a:rPr lang="en-US" sz="1800" dirty="0" smtClean="0"/>
+              <a:rPr lang="en-US" sz="1800" dirty="0"/>
               <a:t>Strategy</a:t>
             </a:r>
           </a:p>
           <a:p>
             <a:pPr lvl="1"/>
             <a:r>
-              <a:rPr lang="en-US" sz="1800" dirty="0" smtClean="0"/>
+              <a:rPr lang="en-US" sz="1800" dirty="0"/>
               <a:t>Template</a:t>
             </a:r>
           </a:p>
           <a:p>
             <a:pPr lvl="1"/>
             <a:r>
-              <a:rPr lang="en-US" sz="1800" dirty="0" smtClean="0"/>
+              <a:rPr lang="en-US" sz="1800" dirty="0"/>
               <a:t>Visitor</a:t>
             </a:r>
           </a:p>
@@ -3248,24 +3186,12 @@
               <a:buNone/>
             </a:pPr>
             <a:r>
-              <a:rPr lang="da-DK" sz="1400" dirty="0" smtClean="0">
-                <a:hlinkClick r:id="rId3"/>
-              </a:rPr>
-              <a:t>http</a:t>
-            </a:r>
-            <a:r>
               <a:rPr lang="da-DK" sz="1400" dirty="0">
                 <a:hlinkClick r:id="rId3"/>
               </a:rPr>
-              <a:t>://</a:t>
-            </a:r>
-            <a:r>
-              <a:rPr lang="da-DK" sz="1400" dirty="0" smtClean="0">
-                <a:hlinkClick r:id="rId3"/>
-              </a:rPr>
-              <a:t>www.dofactory.com/Patterns/Patterns.aspx</a:t>
-            </a:r>
-            <a:endParaRPr lang="en-US" sz="1400" dirty="0" smtClean="0"/>
+              <a:t>http://www.dofactory.com/Patterns/Patterns.aspx</a:t>
+            </a:r>
+            <a:endParaRPr lang="en-US" sz="1400" dirty="0"/>
           </a:p>
         </p:txBody>
       </p:sp>
@@ -3338,13 +3264,6 @@
   <p:clrMapOvr>
     <a:masterClrMapping/>
   </p:clrMapOvr>
-  <p:timing>
-    <p:tnLst>
-      <p:par>
-        <p:cTn id="1" dur="indefinite" restart="never" nodeType="tmRoot"/>
-      </p:par>
-    </p:tnLst>
-  </p:timing>
 </p:sld>
 </file>
 

</xml_diff>